<commit_message>
Updating slides page 14
</commit_message>
<xml_diff>
--- a/Migrating-to-Slurm.pptx
+++ b/Migrating-to-Slurm.pptx
@@ -13659,8 +13659,8 @@
         </p:nvSpPr>
         <p:spPr>
           <a:xfrm>
-            <a:off x="6386103" y="3160238"/>
-            <a:ext cx="6618697" cy="3480390"/>
+            <a:off x="6386103" y="2678968"/>
+            <a:ext cx="6618697" cy="5757194"/>
           </a:xfrm>
           <a:prstGeom prst="rect">
             <a:avLst/>
@@ -13744,9 +13744,68 @@
             </a:pPr>
             <a:r>
               <a:rPr lang="en-US" sz="3200" dirty="0" smtClean="0"/>
-              <a:t>Any module or environment variable set on your terminal during submission time will be passed on to the job</a:t>
-            </a:r>
+              <a:t>Any module or environment variable set on your terminal during submission time will be passed on to the </a:t>
+            </a:r>
+            <a:r>
+              <a:rPr lang="en-US" sz="3200" dirty="0" smtClean="0"/>
+              <a:t>job</a:t>
+            </a:r>
+          </a:p>
+          <a:p>
+            <a:pPr marL="571500" indent="-571500" algn="l">
+              <a:buFont typeface="Arial" panose="020B0604020202020204" pitchFamily="34" charset="0"/>
+              <a:buChar char="•"/>
+              <a:defRPr sz="3200">
+                <a:solidFill>
+                  <a:srgbClr val="000000"/>
+                </a:solidFill>
+                <a:latin typeface="Helvetica Light"/>
+                <a:ea typeface="Helvetica Light"/>
+                <a:cs typeface="Helvetica Light"/>
+                <a:sym typeface="Helvetica Light"/>
+              </a:defRPr>
+            </a:pPr>
             <a:endParaRPr lang="en-US" sz="3200" dirty="0"/>
+          </a:p>
+          <a:p>
+            <a:pPr marL="571500" indent="-571500" algn="l">
+              <a:buFont typeface="Arial" panose="020B0604020202020204" pitchFamily="34" charset="0"/>
+              <a:buChar char="•"/>
+              <a:defRPr sz="3200">
+                <a:solidFill>
+                  <a:srgbClr val="000000"/>
+                </a:solidFill>
+                <a:latin typeface="Helvetica Light"/>
+                <a:ea typeface="Helvetica Light"/>
+                <a:cs typeface="Helvetica Light"/>
+                <a:sym typeface="Helvetica Light"/>
+              </a:defRPr>
+            </a:pPr>
+            <a:r>
+              <a:rPr lang="en-US" sz="3200" dirty="0" smtClean="0"/>
+              <a:t>No need to change directory to </a:t>
+            </a:r>
+            <a:r>
+              <a:rPr lang="en-US" sz="3200" dirty="0" smtClean="0">
+                <a:solidFill>
+                  <a:srgbClr val="333333"/>
+                </a:solidFill>
+                <a:latin typeface="Courier New"/>
+                <a:ea typeface="Courier New"/>
+                <a:cs typeface="Courier New"/>
+                <a:sym typeface="Courier New"/>
+              </a:rPr>
+              <a:t>$PBS_O_WORKDIR</a:t>
+            </a:r>
+            <a:endParaRPr lang="en-US" sz="3200" dirty="0">
+              <a:solidFill>
+                <a:srgbClr val="333333"/>
+              </a:solidFill>
+              <a:latin typeface="Courier New"/>
+              <a:ea typeface="Courier New"/>
+              <a:cs typeface="Courier New"/>
+              <a:sym typeface="Courier New"/>
+            </a:endParaRPr>
           </a:p>
         </p:txBody>
       </p:sp>
@@ -32587,23 +32646,15 @@
             </a:pPr>
             <a:r>
               <a:rPr lang="en-US" sz="4000" dirty="0" smtClean="0"/>
-              <a:t> Jobs </a:t>
-            </a:r>
-            <a:r>
-              <a:rPr lang="en-US" sz="4000" smtClean="0"/>
-              <a:t>cannot </a:t>
-            </a:r>
-            <a:r>
-              <a:rPr lang="en-US" sz="4000" smtClean="0"/>
+              <a:t> Jobs cannot </a:t>
+            </a:r>
+            <a:r>
+              <a:rPr lang="en-US" sz="4000" dirty="0" smtClean="0"/>
               <a:t>overstep</a:t>
             </a:r>
             <a:r>
-              <a:rPr lang="en-US" sz="4000" smtClean="0"/>
-              <a:t> </a:t>
-            </a:r>
-            <a:r>
               <a:rPr lang="en-US" sz="4000" dirty="0" smtClean="0"/>
-              <a:t>reserved </a:t>
+              <a:t> reserved </a:t>
             </a:r>
             <a:r>
               <a:rPr lang="en-US" sz="4000" dirty="0" smtClean="0"/>

</xml_diff>